<commit_message>
corrected spelling error in presentation
</commit_message>
<xml_diff>
--- a/examenopdracht.pptx
+++ b/examenopdracht.pptx
@@ -126,7 +126,7 @@
 <file path=ppt/revisionInfo.xml><?xml version="1.0" encoding="utf-8"?>
 <p1510:revInfo xmlns:a="http://schemas.openxmlformats.org/drawingml/2006/main" xmlns:r="http://schemas.openxmlformats.org/officeDocument/2006/relationships" xmlns:p1510="http://schemas.microsoft.com/office/powerpoint/2015/10/main">
   <p1510:revLst>
-    <p1510:client id="{35D33339-24BD-EB1C-E71D-59CFA3CB9679}" v="2665" dt="2020-05-20T00:06:42.825"/>
+    <p1510:client id="{35D33339-24BD-EB1C-E71D-59CFA3CB9679}" v="2671" dt="2020-05-20T00:10:43.844"/>
   </p1510:revLst>
 </p1510:revInfo>
 </file>
@@ -6716,8 +6716,8 @@
               <a:t>- </a:t>
             </a:r>
             <a:r>
-              <a:rPr lang="nl-NL" dirty="0" err="1"/>
-              <a:t>Pythonbindings</a:t>
+              <a:rPr lang="nl-NL"/>
+              <a:t>Python bindings</a:t>
             </a:r>
             <a:r>
               <a:rPr lang="nl-NL" dirty="0"/>
@@ -6726,11 +6726,11 @@
           </a:p>
           <a:p>
             <a:r>
-              <a:rPr lang="nl-NL" dirty="0"/>
-              <a:t>- Gebruikmaken van </a:t>
-            </a:r>
-            <a:r>
-              <a:rPr lang="nl-NL" dirty="0" err="1"/>
+              <a:rPr lang="nl-NL"/>
+              <a:t>- Gebruik maken van </a:t>
+            </a:r>
+            <a:r>
+              <a:rPr lang="nl-NL" err="1"/>
               <a:t>mpi</a:t>
             </a:r>
             <a:r>
@@ -6738,9 +6738,10 @@
               <a:t> voor </a:t>
             </a:r>
             <a:r>
-              <a:rPr lang="nl-NL" dirty="0" err="1"/>
+              <a:rPr lang="nl-NL" err="1"/>
               <a:t>multithreading</a:t>
             </a:r>
+            <a:endParaRPr lang="nl-NL"/>
           </a:p>
           <a:p>
             <a:endParaRPr lang="nl-NL" dirty="0"/>

</xml_diff>